<commit_message>
Close informal story and Op-Ed.
</commit_message>
<xml_diff>
--- a/ENGIN 295 Storytelling/Editorial Piece/Autonomous Robots in Surgery.pptx
+++ b/ENGIN 295 Storytelling/Editorial Piece/Autonomous Robots in Surgery.pptx
@@ -16,32 +16,40 @@
     <p:sldId id="261" r:id="rId9"/>
     <p:sldId id="262" r:id="rId10"/>
     <p:sldId id="263" r:id="rId11"/>
+    <p:sldId id="264" r:id="rId12"/>
   </p:sldIdLst>
   <p:sldSz cx="9144000" cy="5143500"/>
   <p:notesSz cx="6858000" cy="9144000"/>
   <p:embeddedFontLst>
     <p:embeddedFont>
       <p:font typeface="Raleway ExtraBold"/>
-      <p:bold r:id="rId15"/>
-      <p:boldItalic r:id="rId16"/>
+      <p:bold r:id="rId16"/>
+      <p:boldItalic r:id="rId17"/>
     </p:embeddedFont>
     <p:embeddedFont>
       <p:font typeface="Raleway SemiBold"/>
-      <p:regular r:id="rId17"/>
-      <p:bold r:id="rId18"/>
-      <p:italic r:id="rId19"/>
-      <p:boldItalic r:id="rId20"/>
+      <p:regular r:id="rId18"/>
+      <p:bold r:id="rId19"/>
+      <p:italic r:id="rId20"/>
+      <p:boldItalic r:id="rId21"/>
     </p:embeddedFont>
     <p:embeddedFont>
       <p:font typeface="Raleway"/>
-      <p:regular r:id="rId21"/>
-      <p:bold r:id="rId22"/>
-      <p:italic r:id="rId23"/>
-      <p:boldItalic r:id="rId24"/>
+      <p:regular r:id="rId22"/>
+      <p:bold r:id="rId23"/>
+      <p:italic r:id="rId24"/>
+      <p:boldItalic r:id="rId25"/>
+    </p:embeddedFont>
+    <p:embeddedFont>
+      <p:font typeface="Cambria" panose="02040503050406030204" charset="0"/>
+      <p:regular r:id="rId26"/>
+      <p:bold r:id="rId27"/>
+      <p:italic r:id="rId28"/>
+      <p:boldItalic r:id="rId29"/>
     </p:embeddedFont>
   </p:embeddedFontLst>
   <p:custDataLst>
-    <p:tags r:id="rId25"/>
+    <p:tags r:id="rId30"/>
   </p:custDataLst>
   <p:defaultTextStyle>
     <a:defPPr marR="0" lvl="0" algn="l" rtl="0">
@@ -1525,6 +1533,105 @@
 </file>
 
 <file path=ppt/notesSlides/notesSlide8.xml><?xml version="1.0" encoding="utf-8"?>
+<p:notes xmlns:a="http://schemas.openxmlformats.org/drawingml/2006/main" xmlns:r="http://schemas.openxmlformats.org/officeDocument/2006/relationships" xmlns:p="http://schemas.openxmlformats.org/presentationml/2006/main" showMasterPhAnim="0" showMasterSp="0">
+  <p:cSld>
+    <p:spTree>
+      <p:nvGrpSpPr>
+        <p:cNvPr id="98" name="Shape 98"/>
+        <p:cNvGrpSpPr/>
+        <p:nvPr/>
+      </p:nvGrpSpPr>
+      <p:grpSpPr>
+        <a:xfrm>
+          <a:off x="0" y="0"/>
+          <a:ext cx="0" cy="0"/>
+          <a:chOff x="0" y="0"/>
+          <a:chExt cx="0" cy="0"/>
+        </a:xfrm>
+      </p:grpSpPr>
+      <p:sp>
+        <p:nvSpPr>
+          <p:cNvPr id="99" name="Google Shape;99;g310eb073895_0_744:notes"/>
+          <p:cNvSpPr/>
+          <p:nvPr>
+            <p:ph type="sldImg" idx="2"/>
+          </p:nvPr>
+        </p:nvSpPr>
+        <p:spPr>
+          <a:xfrm>
+            <a:off x="381300" y="685800"/>
+            <a:ext cx="6096000" cy="3429000"/>
+          </a:xfrm>
+          <a:custGeom>
+            <a:avLst/>
+            <a:gdLst/>
+            <a:ahLst/>
+            <a:cxnLst/>
+            <a:rect l="l" t="t" r="r" b="b"/>
+            <a:pathLst>
+              <a:path w="120000" h="120000" extrusionOk="0">
+                <a:moveTo>
+                  <a:pt x="0" y="0"/>
+                </a:moveTo>
+                <a:lnTo>
+                  <a:pt x="120000" y="0"/>
+                </a:lnTo>
+                <a:lnTo>
+                  <a:pt x="120000" y="120000"/>
+                </a:lnTo>
+                <a:lnTo>
+                  <a:pt x="0" y="120000"/>
+                </a:lnTo>
+                <a:close/>
+              </a:path>
+            </a:pathLst>
+          </a:custGeom>
+        </p:spPr>
+      </p:sp>
+      <p:sp>
+        <p:nvSpPr>
+          <p:cNvPr id="100" name="Google Shape;100;g310eb073895_0_744:notes"/>
+          <p:cNvSpPr txBox="1"/>
+          <p:nvPr>
+            <p:ph type="body" idx="1"/>
+          </p:nvPr>
+        </p:nvSpPr>
+        <p:spPr>
+          <a:xfrm>
+            <a:off x="685800" y="4343400"/>
+            <a:ext cx="5486400" cy="4114800"/>
+          </a:xfrm>
+          <a:prstGeom prst="rect">
+            <a:avLst/>
+          </a:prstGeom>
+        </p:spPr>
+        <p:txBody>
+          <a:bodyPr spcFirstLastPara="1" wrap="square" lIns="91425" tIns="91425" rIns="91425" bIns="91425" anchor="t" anchorCtr="0">
+            <a:noAutofit/>
+          </a:bodyPr>
+          <a:lstStyle/>
+          <a:p>
+            <a:pPr marL="0" lvl="0" indent="0" algn="l" rtl="0">
+              <a:spcBef>
+                <a:spcPts val="0"/>
+              </a:spcBef>
+              <a:spcAft>
+                <a:spcPts val="0"/>
+              </a:spcAft>
+              <a:buNone/>
+            </a:pPr>
+          </a:p>
+        </p:txBody>
+      </p:sp>
+    </p:spTree>
+  </p:cSld>
+  <p:clrMapOvr>
+    <a:masterClrMapping/>
+  </p:clrMapOvr>
+</p:notes>
+</file>
+
+<file path=ppt/notesSlides/notesSlide9.xml><?xml version="1.0" encoding="utf-8"?>
 <p:notes xmlns:a="http://schemas.openxmlformats.org/drawingml/2006/main" xmlns:r="http://schemas.openxmlformats.org/officeDocument/2006/relationships" xmlns:p="http://schemas.openxmlformats.org/presentationml/2006/main" showMasterPhAnim="0" showMasterSp="0">
   <p:cSld>
     <p:spTree>
@@ -6563,7 +6670,7 @@
       </p:pic>
       <p:pic>
         <p:nvPicPr>
-          <p:cNvPr id="1" name="图片 0"/>
+          <p:cNvPr id="2" name="图片 1"/>
           <p:cNvPicPr/>
           <p:nvPr/>
         </p:nvPicPr>
@@ -7890,6 +7997,225 @@
               <a:solidFill>
                 <a:srgbClr val="FFFFFF"/>
               </a:solidFill>
+            </a:endParaRPr>
+          </a:p>
+        </p:txBody>
+      </p:sp>
+    </p:spTree>
+  </p:cSld>
+  <p:clrMapOvr>
+    <a:masterClrMapping/>
+  </p:clrMapOvr>
+</p:sld>
+</file>
+
+<file path=ppt/slides/slide9.xml><?xml version="1.0" encoding="utf-8"?>
+<p:sld xmlns:a="http://schemas.openxmlformats.org/drawingml/2006/main" xmlns:r="http://schemas.openxmlformats.org/officeDocument/2006/relationships" xmlns:p="http://schemas.openxmlformats.org/presentationml/2006/main">
+  <p:cSld>
+    <p:bg>
+      <p:bgPr>
+        <a:solidFill>
+          <a:schemeClr val="lt1"/>
+        </a:solidFill>
+        <a:effectLst/>
+      </p:bgPr>
+    </p:bg>
+    <p:spTree>
+      <p:nvGrpSpPr>
+        <p:cNvPr id="101" name="Shape 101"/>
+        <p:cNvGrpSpPr/>
+        <p:nvPr/>
+      </p:nvGrpSpPr>
+      <p:grpSpPr>
+        <a:xfrm>
+          <a:off x="0" y="0"/>
+          <a:ext cx="0" cy="0"/>
+          <a:chOff x="0" y="0"/>
+          <a:chExt cx="0" cy="0"/>
+        </a:xfrm>
+      </p:grpSpPr>
+      <p:pic>
+        <p:nvPicPr>
+          <p:cNvPr id="4" name="图片 1" descr="Robot"/>
+          <p:cNvPicPr>
+            <a:picLocks noChangeAspect="1"/>
+          </p:cNvPicPr>
+          <p:nvPr/>
+        </p:nvPicPr>
+        <p:blipFill>
+          <a:blip r:embed="rId1"/>
+          <a:stretch>
+            <a:fillRect/>
+          </a:stretch>
+        </p:blipFill>
+        <p:spPr>
+          <a:xfrm>
+            <a:off x="2206625" y="767715"/>
+            <a:ext cx="5289550" cy="3422650"/>
+          </a:xfrm>
+          <a:prstGeom prst="rect">
+            <a:avLst/>
+          </a:prstGeom>
+        </p:spPr>
+      </p:pic>
+      <p:sp>
+        <p:nvSpPr>
+          <p:cNvPr id="5" name="矩形 4"/>
+          <p:cNvSpPr/>
+          <p:nvPr/>
+        </p:nvSpPr>
+        <p:spPr>
+          <a:xfrm>
+            <a:off x="2139315" y="1134745"/>
+            <a:ext cx="2262505" cy="2664460"/>
+          </a:xfrm>
+          <a:prstGeom prst="rect">
+            <a:avLst/>
+          </a:prstGeom>
+          <a:noFill/>
+          <a:ln w="28575" cmpd="sng">
+            <a:solidFill>
+              <a:srgbClr val="48A088"/>
+            </a:solidFill>
+            <a:prstDash val="solid"/>
+          </a:ln>
+        </p:spPr>
+        <p:style>
+          <a:lnRef idx="2">
+            <a:schemeClr val="accent1">
+              <a:lumMod val="75000"/>
+            </a:schemeClr>
+          </a:lnRef>
+          <a:fillRef idx="1">
+            <a:schemeClr val="accent1"/>
+          </a:fillRef>
+          <a:effectRef idx="0">
+            <a:srgbClr val="FFFFFF"/>
+          </a:effectRef>
+          <a:fontRef idx="minor">
+            <a:schemeClr val="lt1"/>
+          </a:fontRef>
+        </p:style>
+        <p:txBody>
+          <a:bodyPr rtlCol="0" anchor="ctr"/>
+          <a:p>
+            <a:pPr algn="ctr"/>
+            <a:endParaRPr lang="zh-CN" altLang="en-US"/>
+          </a:p>
+        </p:txBody>
+      </p:sp>
+      <p:sp>
+        <p:nvSpPr>
+          <p:cNvPr id="6" name="文本框 5"/>
+          <p:cNvSpPr txBox="1"/>
+          <p:nvPr/>
+        </p:nvSpPr>
+        <p:spPr>
+          <a:xfrm>
+            <a:off x="2139315" y="1134745"/>
+            <a:ext cx="3048000" cy="306705"/>
+          </a:xfrm>
+          <a:prstGeom prst="rect">
+            <a:avLst/>
+          </a:prstGeom>
+          <a:noFill/>
+        </p:spPr>
+        <p:txBody>
+          <a:bodyPr wrap="square" rtlCol="0">
+            <a:spAutoFit/>
+          </a:bodyPr>
+          <a:p>
+            <a:r>
+              <a:rPr lang="en-US" altLang="zh-CN" b="1">
+                <a:latin typeface="Cambria" panose="02040503050406030204" charset="0"/>
+                <a:cs typeface="Cambria" panose="02040503050406030204" charset="0"/>
+              </a:rPr>
+              <a:t>Surgeon Console</a:t>
+            </a:r>
+            <a:endParaRPr lang="en-US" altLang="zh-CN" b="1">
+              <a:latin typeface="Cambria" panose="02040503050406030204" charset="0"/>
+              <a:cs typeface="Cambria" panose="02040503050406030204" charset="0"/>
+            </a:endParaRPr>
+          </a:p>
+        </p:txBody>
+      </p:sp>
+      <p:sp>
+        <p:nvSpPr>
+          <p:cNvPr id="8" name="矩形 7"/>
+          <p:cNvSpPr/>
+          <p:nvPr/>
+        </p:nvSpPr>
+        <p:spPr>
+          <a:xfrm>
+            <a:off x="4490085" y="767715"/>
+            <a:ext cx="1552575" cy="2371090"/>
+          </a:xfrm>
+          <a:prstGeom prst="rect">
+            <a:avLst/>
+          </a:prstGeom>
+          <a:noFill/>
+          <a:ln w="28575" cmpd="sng">
+            <a:solidFill>
+              <a:srgbClr val="48A088"/>
+            </a:solidFill>
+            <a:prstDash val="solid"/>
+          </a:ln>
+        </p:spPr>
+        <p:style>
+          <a:lnRef idx="2">
+            <a:schemeClr val="accent1">
+              <a:lumMod val="75000"/>
+            </a:schemeClr>
+          </a:lnRef>
+          <a:fillRef idx="1">
+            <a:schemeClr val="accent1"/>
+          </a:fillRef>
+          <a:effectRef idx="0">
+            <a:srgbClr val="FFFFFF"/>
+          </a:effectRef>
+          <a:fontRef idx="minor">
+            <a:schemeClr val="lt1"/>
+          </a:fontRef>
+        </p:style>
+        <p:txBody>
+          <a:bodyPr rtlCol="0" anchor="ctr"/>
+          <a:p>
+            <a:pPr algn="ctr"/>
+            <a:endParaRPr lang="zh-CN" altLang="en-US"/>
+          </a:p>
+        </p:txBody>
+      </p:sp>
+      <p:sp>
+        <p:nvSpPr>
+          <p:cNvPr id="9" name="文本框 8"/>
+          <p:cNvSpPr txBox="1"/>
+          <p:nvPr/>
+        </p:nvSpPr>
+        <p:spPr>
+          <a:xfrm>
+            <a:off x="4490085" y="767715"/>
+            <a:ext cx="1782445" cy="306705"/>
+          </a:xfrm>
+          <a:prstGeom prst="rect">
+            <a:avLst/>
+          </a:prstGeom>
+          <a:noFill/>
+        </p:spPr>
+        <p:txBody>
+          <a:bodyPr wrap="square" rtlCol="0">
+            <a:spAutoFit/>
+          </a:bodyPr>
+          <a:p>
+            <a:r>
+              <a:rPr lang="en-US" altLang="zh-CN" b="1">
+                <a:latin typeface="Cambria" panose="02040503050406030204" charset="0"/>
+                <a:cs typeface="Cambria" panose="02040503050406030204" charset="0"/>
+              </a:rPr>
+              <a:t>Robotic Arms</a:t>
+            </a:r>
+            <a:endParaRPr lang="en-US" altLang="zh-CN" b="1">
+              <a:latin typeface="Cambria" panose="02040503050406030204" charset="0"/>
+              <a:cs typeface="Cambria" panose="02040503050406030204" charset="0"/>
             </a:endParaRPr>
           </a:p>
         </p:txBody>

</xml_diff>